<commit_message>
fixed: Esercitazione 7.pptx | added: Esercitazione 7.pdf
</commit_message>
<xml_diff>
--- a/esercitazione_7/documents/Esercitazione 7.pptx
+++ b/esercitazione_7/documents/Esercitazione 7.pptx
@@ -6291,7 +6291,7 @@
                   </a:solidFill>
                   <a:latin typeface="Open Sans Light Bold"/>
                 </a:rPr>
-                <a:t>5</a:t>
+                <a:t>6</a:t>
               </a:r>
             </a:p>
           </p:txBody>
@@ -6929,7 +6929,7 @@
                 </a:solidFill>
                 <a:latin typeface="Open Sans Light Bold"/>
               </a:rPr>
-              <a:t>6</a:t>
+              <a:t>7</a:t>
             </a:r>
           </a:p>
         </p:txBody>
@@ -7442,7 +7442,7 @@
                   </a:solidFill>
                   <a:latin typeface="Open Sans Light Bold"/>
                 </a:rPr>
-                <a:t>9</a:t>
+                <a:t>8</a:t>
               </a:r>
             </a:p>
           </p:txBody>
@@ -8104,7 +8104,7 @@
                   </a:solidFill>
                   <a:latin typeface="Open Sans Light Bold"/>
                 </a:rPr>
-                <a:t>10</a:t>
+                <a:t>9</a:t>
               </a:r>
             </a:p>
           </p:txBody>

</xml_diff>